<commit_message>
Update BDT Final Project Presentation.pptx
</commit_message>
<xml_diff>
--- a/BDT Final Project Presentation.pptx
+++ b/BDT Final Project Presentation.pptx
@@ -8592,7 +8592,7 @@
           <a:p>
             <a:r>
               <a:rPr lang="en-US" b="1" dirty="0"/>
-              <a:t>Member</a:t>
+              <a:t>Student</a:t>
             </a:r>
           </a:p>
           <a:p>
@@ -8971,7 +8971,12 @@
             <p:ph type="title"/>
           </p:nvPr>
         </p:nvSpPr>
-        <p:spPr/>
+        <p:spPr>
+          <a:xfrm>
+            <a:off x="831850" y="1709739"/>
+            <a:ext cx="10515600" cy="1719262"/>
+          </a:xfrm>
+        </p:spPr>
         <p:txBody>
           <a:bodyPr/>
           <a:lstStyle/>
@@ -8979,7 +8984,7 @@
             <a:pPr algn="ctr"/>
             <a:r>
               <a:rPr lang="en-US" dirty="0"/>
-              <a:t>Thank you for your attention !!!</a:t>
+              <a:t>Thank you for your attention</a:t>
             </a:r>
           </a:p>
         </p:txBody>
@@ -9104,18 +9109,6 @@
               <a:rPr lang="en-US" dirty="0"/>
               <a:t>Demonstration</a:t>
             </a:r>
-          </a:p>
-          <a:p>
-            <a:r>
-              <a:rPr lang="en-US" dirty="0"/>
-              <a:t>Q &amp; A</a:t>
-            </a:r>
-          </a:p>
-          <a:p>
-            <a:pPr marL="0" indent="0">
-              <a:buNone/>
-            </a:pPr>
-            <a:endParaRPr lang="en-US" dirty="0"/>
           </a:p>
         </p:txBody>
       </p:sp>
@@ -9988,7 +9981,7 @@
                   <a:srgbClr val="0432FF"/>
                 </a:solidFill>
               </a:rPr>
-              <a:t>Create report using Power PI</a:t>
+              <a:t>Create report using Power BI</a:t>
             </a:r>
           </a:p>
         </p:txBody>
@@ -13611,6 +13604,16 @@
             </a:r>
             <a:r>
               <a:rPr lang="en-US" dirty="0"/>
+              <a:t> Create Hive table, create partitions (based on symbol), select data from Hive table</a:t>
+            </a:r>
+          </a:p>
+          <a:p>
+            <a:r>
+              <a:rPr lang="en-US" b="1" u="sng" dirty="0"/>
+              <a:t>Step 2:</a:t>
+            </a:r>
+            <a:r>
+              <a:rPr lang="en-US" dirty="0"/>
               <a:t> Create Kafka topic: 3 topics</a:t>
             </a:r>
           </a:p>
@@ -13624,7 +13627,7 @@
           <a:p>
             <a:r>
               <a:rPr lang="en-US" b="1" u="sng" dirty="0"/>
-              <a:t>Step 2:</a:t>
+              <a:t>Step 3:</a:t>
             </a:r>
             <a:r>
               <a:rPr lang="en-US" dirty="0"/>
@@ -13641,7 +13644,7 @@
           <a:p>
             <a:r>
               <a:rPr lang="en-US" b="1" u="sng" dirty="0"/>
-              <a:t>Step 3:</a:t>
+              <a:t>Step 4:</a:t>
             </a:r>
             <a:r>
               <a:rPr lang="en-US" dirty="0"/>
@@ -13658,21 +13661,11 @@
           <a:p>
             <a:r>
               <a:rPr lang="en-US" b="1" u="sng" dirty="0"/>
-              <a:t>Step 4:</a:t>
+              <a:t>Step 5:</a:t>
             </a:r>
             <a:r>
               <a:rPr lang="en-US" dirty="0"/>
               <a:t> Check data in HDFS</a:t>
-            </a:r>
-          </a:p>
-          <a:p>
-            <a:r>
-              <a:rPr lang="en-US" b="1" u="sng" dirty="0"/>
-              <a:t>Step 5:</a:t>
-            </a:r>
-            <a:r>
-              <a:rPr lang="en-US" dirty="0"/>
-              <a:t> Create Hive table, create partitions (based on symbol), select data from Hive table</a:t>
             </a:r>
           </a:p>
           <a:p>

</xml_diff>